<commit_message>
fixed bugs and made changes to power point
</commit_message>
<xml_diff>
--- a/PowerPoint/Recipe Search App.pptx
+++ b/PowerPoint/Recipe Search App.pptx
@@ -6479,13 +6479,21 @@
               <a:buChar char="●"/>
             </a:pPr>
             <a:r>
-              <a:rPr lang="en" dirty="0"/>
+              <a:rPr lang="en" dirty="0">
+                <a:solidFill>
+                  <a:schemeClr val="tx1"/>
+                </a:solidFill>
+              </a:rPr>
               <a:t>This is a website that allows users to enter a type of food and get multiple recipes back.</a:t>
             </a:r>
           </a:p>
           <a:p>
             <a:r>
-              <a:rPr lang="en-US" dirty="0"/>
+              <a:rPr lang="en-US" dirty="0">
+                <a:solidFill>
+                  <a:schemeClr val="tx1"/>
+                </a:solidFill>
+              </a:rPr>
               <a:t>AS a home cook, I WANT to find recipes, SO THAT I can try new dishes.</a:t>
             </a:r>
           </a:p>
@@ -6501,7 +6509,11 @@
               <a:buChar char="●"/>
             </a:pPr>
             <a:r>
-              <a:rPr lang="en-US" dirty="0"/>
+              <a:rPr lang="en-US" dirty="0">
+                <a:solidFill>
+                  <a:schemeClr val="tx1"/>
+                </a:solidFill>
+              </a:rPr>
               <a:t>GIVEN I cook at home, WHEN I search an ingredient, THEN I get recipes</a:t>
             </a:r>
           </a:p>
@@ -6624,18 +6636,34 @@
               <a:buChar char="●"/>
             </a:pPr>
             <a:r>
-              <a:rPr lang="en" dirty="0"/>
+              <a:rPr lang="en" dirty="0">
+                <a:solidFill>
+                  <a:schemeClr val="tx1"/>
+                </a:solidFill>
+              </a:rPr>
               <a:t>Semantic UI, Edamam recipe search API and Nutrional Search API, J</a:t>
             </a:r>
             <a:r>
-              <a:rPr lang="en-US" dirty="0"/>
+              <a:rPr lang="en-US" dirty="0">
+                <a:solidFill>
+                  <a:schemeClr val="tx1"/>
+                </a:solidFill>
+              </a:rPr>
               <a:t>q</a:t>
             </a:r>
             <a:r>
-              <a:rPr lang="en" dirty="0"/>
+              <a:rPr lang="en" dirty="0">
+                <a:solidFill>
+                  <a:schemeClr val="tx1"/>
+                </a:solidFill>
+              </a:rPr>
               <a:t>uery, JavaScript, HTML, CSS.</a:t>
             </a:r>
-            <a:endParaRPr dirty="0"/>
+            <a:endParaRPr dirty="0">
+              <a:solidFill>
+                <a:schemeClr val="tx1"/>
+              </a:solidFill>
+            </a:endParaRPr>
           </a:p>
           <a:p>
             <a:pPr marL="457200" lvl="0" indent="-342900" algn="l" rtl="0">
@@ -6649,10 +6677,18 @@
               <a:buChar char="●"/>
             </a:pPr>
             <a:r>
-              <a:rPr lang="en-US" dirty="0"/>
+              <a:rPr lang="en-US" dirty="0">
+                <a:solidFill>
+                  <a:schemeClr val="tx1"/>
+                </a:solidFill>
+              </a:rPr>
               <a:t>Homepage – Sandeep, Recipe Page – Cheri, Modals - Chad</a:t>
             </a:r>
-            <a:endParaRPr dirty="0"/>
+            <a:endParaRPr dirty="0">
+              <a:solidFill>
+                <a:schemeClr val="tx1"/>
+              </a:solidFill>
+            </a:endParaRPr>
           </a:p>
           <a:p>
             <a:pPr marL="457200" lvl="0" indent="-342900" algn="l" rtl="0">
@@ -6666,10 +6702,18 @@
               <a:buChar char="●"/>
             </a:pPr>
             <a:r>
-              <a:rPr lang="en" dirty="0"/>
+              <a:rPr lang="en" dirty="0">
+                <a:solidFill>
+                  <a:schemeClr val="tx1"/>
+                </a:solidFill>
+              </a:rPr>
               <a:t>Trying to connect the two pages, API usage, GITHUB issues.</a:t>
             </a:r>
-            <a:endParaRPr dirty="0"/>
+            <a:endParaRPr dirty="0">
+              <a:solidFill>
+                <a:schemeClr val="tx1"/>
+              </a:solidFill>
+            </a:endParaRPr>
           </a:p>
           <a:p>
             <a:pPr marL="457200" lvl="0" indent="-342900" algn="l" rtl="0">
@@ -6683,10 +6727,18 @@
               <a:buChar char="●"/>
             </a:pPr>
             <a:r>
-              <a:rPr lang="en" dirty="0"/>
+              <a:rPr lang="en" dirty="0">
+                <a:solidFill>
+                  <a:schemeClr val="tx1"/>
+                </a:solidFill>
+              </a:rPr>
               <a:t>Getting the APIs to function correctly, correcting the GITHUB issues and making the two pages work together.</a:t>
             </a:r>
-            <a:endParaRPr dirty="0"/>
+            <a:endParaRPr dirty="0">
+              <a:solidFill>
+                <a:schemeClr val="tx1"/>
+              </a:solidFill>
+            </a:endParaRPr>
           </a:p>
         </p:txBody>
       </p:sp>
@@ -6883,7 +6935,11 @@
               </a:spcAft>
             </a:pPr>
             <a:r>
-              <a:rPr lang="en-US" dirty="0"/>
+              <a:rPr lang="en-US" dirty="0">
+                <a:solidFill>
+                  <a:schemeClr val="tx1"/>
+                </a:solidFill>
+              </a:rPr>
               <a:t>Add option for random search</a:t>
             </a:r>
           </a:p>
@@ -6894,7 +6950,11 @@
               </a:spcAft>
             </a:pPr>
             <a:r>
-              <a:rPr lang="en-US" dirty="0"/>
+              <a:rPr lang="en-US" dirty="0">
+                <a:solidFill>
+                  <a:schemeClr val="tx1"/>
+                </a:solidFill>
+              </a:rPr>
               <a:t>Add page implementation to search results</a:t>
             </a:r>
           </a:p>
@@ -6905,10 +6965,18 @@
               </a:spcAft>
             </a:pPr>
             <a:r>
-              <a:rPr lang="en-US" dirty="0"/>
+              <a:rPr lang="en-US" dirty="0">
+                <a:solidFill>
+                  <a:schemeClr val="tx1"/>
+                </a:solidFill>
+              </a:rPr>
               <a:t>Creating a favorite list</a:t>
             </a:r>
-            <a:endParaRPr dirty="0"/>
+            <a:endParaRPr dirty="0">
+              <a:solidFill>
+                <a:schemeClr val="tx1"/>
+              </a:solidFill>
+            </a:endParaRPr>
           </a:p>
         </p:txBody>
       </p:sp>

</xml_diff>